<commit_message>
update ppt with CT OT and IDG pipelines
</commit_message>
<xml_diff>
--- a/presentations/Slide_Deck.pptx
+++ b/presentations/Slide_Deck.pptx
@@ -5,12 +5,18 @@
     <p:sldMasterId id="2147483672" r:id="rId4"/>
   </p:sldMasterIdLst>
   <p:notesMasterIdLst>
-    <p:notesMasterId r:id="rId8"/>
+    <p:notesMasterId r:id="rId14"/>
   </p:notesMasterIdLst>
   <p:sldIdLst>
     <p:sldId id="256" r:id="rId5"/>
     <p:sldId id="257" r:id="rId6"/>
     <p:sldId id="258" r:id="rId7"/>
+    <p:sldId id="259" r:id="rId8"/>
+    <p:sldId id="261" r:id="rId9"/>
+    <p:sldId id="262" r:id="rId10"/>
+    <p:sldId id="263" r:id="rId11"/>
+    <p:sldId id="264" r:id="rId12"/>
+    <p:sldId id="260" r:id="rId13"/>
   </p:sldIdLst>
   <p:sldSz cx="12192000" cy="6858000"/>
   <p:notesSz cx="6858000" cy="9144000"/>
@@ -210,7 +216,7 @@
           <a:p>
             <a:fld id="{6B374326-AD78-4E67-8599-BA8A5604D89A}" type="datetimeFigureOut">
               <a:rPr lang="en-US" smtClean="0"/>
-              <a:t>1/15/24</a:t>
+              <a:t>1/16/24</a:t>
             </a:fld>
             <a:endParaRPr lang="en-US"/>
           </a:p>
@@ -1658,7 +1664,7 @@
         </p:nvSpPr>
         <p:spPr>
           <a:xfrm>
-            <a:off x="1222053" y="320156"/>
+            <a:off x="591117" y="0"/>
             <a:ext cx="10651402" cy="1143000"/>
           </a:xfrm>
         </p:spPr>
@@ -1685,8 +1691,8 @@
         </p:nvSpPr>
         <p:spPr>
           <a:xfrm>
-            <a:off x="1222053" y="1736231"/>
-            <a:ext cx="10651402" cy="3895344"/>
+            <a:off x="591116" y="1143000"/>
+            <a:ext cx="11515539" cy="3895344"/>
           </a:xfrm>
         </p:spPr>
         <p:txBody>
@@ -1911,8 +1917,8 @@
         </p:nvSpPr>
         <p:spPr>
           <a:xfrm>
-            <a:off x="774183" y="258055"/>
-            <a:ext cx="9753600" cy="1444752"/>
+            <a:off x="667503" y="73152"/>
+            <a:ext cx="5961897" cy="630936"/>
           </a:xfrm>
         </p:spPr>
         <p:txBody>
@@ -1954,8 +1960,419 @@
         </p:blipFill>
         <p:spPr>
           <a:xfrm>
-            <a:off x="2783957" y="1217953"/>
-            <a:ext cx="6134101" cy="4652592"/>
+            <a:off x="667503" y="957309"/>
+            <a:ext cx="6092136" cy="4620762"/>
+          </a:xfrm>
+          <a:prstGeom prst="rect">
+            <a:avLst/>
+          </a:prstGeom>
+        </p:spPr>
+      </p:pic>
+      <p:graphicFrame>
+        <p:nvGraphicFramePr>
+          <p:cNvPr id="4" name="Table 3">
+            <a:extLst>
+              <a:ext uri="{FF2B5EF4-FFF2-40B4-BE49-F238E27FC236}">
+                <a16:creationId xmlns:a16="http://schemas.microsoft.com/office/drawing/2014/main" id="{BAA92603-802E-F9DC-8C74-440BAD03C237}"/>
+              </a:ext>
+            </a:extLst>
+          </p:cNvPr>
+          <p:cNvGraphicFramePr>
+            <a:graphicFrameLocks noGrp="1"/>
+          </p:cNvGraphicFramePr>
+          <p:nvPr>
+            <p:extLst>
+              <p:ext uri="{D42A27DB-BD31-4B8C-83A1-F6EECF244321}">
+                <p14:modId xmlns:p14="http://schemas.microsoft.com/office/powerpoint/2010/main" val="719812924"/>
+              </p:ext>
+            </p:extLst>
+          </p:nvPr>
+        </p:nvGraphicFramePr>
+        <p:xfrm>
+          <a:off x="7022588" y="1490472"/>
+          <a:ext cx="4998086" cy="3017520"/>
+        </p:xfrm>
+        <a:graphic>
+          <a:graphicData uri="http://schemas.openxmlformats.org/drawingml/2006/table">
+            <a:tbl>
+              <a:tblPr firstRow="1" bandRow="1">
+                <a:tableStyleId>{5C22544A-7EE6-4342-B048-85BDC9FD1C3A}</a:tableStyleId>
+              </a:tblPr>
+              <a:tblGrid>
+                <a:gridCol w="1840058">
+                  <a:extLst>
+                    <a:ext uri="{9D8B030D-6E8A-4147-A177-3AD203B41FA5}">
+                      <a16:colId xmlns:a16="http://schemas.microsoft.com/office/drawing/2014/main" val="4020813307"/>
+                    </a:ext>
+                  </a:extLst>
+                </a:gridCol>
+                <a:gridCol w="1301262">
+                  <a:extLst>
+                    <a:ext uri="{9D8B030D-6E8A-4147-A177-3AD203B41FA5}">
+                      <a16:colId xmlns:a16="http://schemas.microsoft.com/office/drawing/2014/main" val="2113962092"/>
+                    </a:ext>
+                  </a:extLst>
+                </a:gridCol>
+                <a:gridCol w="1856766">
+                  <a:extLst>
+                    <a:ext uri="{9D8B030D-6E8A-4147-A177-3AD203B41FA5}">
+                      <a16:colId xmlns:a16="http://schemas.microsoft.com/office/drawing/2014/main" val="311353306"/>
+                    </a:ext>
+                  </a:extLst>
+                </a:gridCol>
+              </a:tblGrid>
+              <a:tr h="263514">
+                <a:tc>
+                  <a:txBody>
+                    <a:bodyPr/>
+                    <a:lstStyle/>
+                    <a:p>
+                      <a:r>
+                        <a:rPr lang="en-US" sz="1200" dirty="0"/>
+                        <a:t>Database</a:t>
+                      </a:r>
+                    </a:p>
+                  </a:txBody>
+                  <a:tcPr/>
+                </a:tc>
+                <a:tc>
+                  <a:txBody>
+                    <a:bodyPr/>
+                    <a:lstStyle/>
+                    <a:p>
+                      <a:r>
+                        <a:rPr lang="en-US" sz="1200" dirty="0"/>
+                        <a:t>Content</a:t>
+                      </a:r>
+                    </a:p>
+                  </a:txBody>
+                  <a:tcPr/>
+                </a:tc>
+                <a:tc>
+                  <a:txBody>
+                    <a:bodyPr/>
+                    <a:lstStyle/>
+                    <a:p>
+                      <a:r>
+                        <a:rPr lang="en-US" sz="1200" dirty="0"/>
+                        <a:t>Processing</a:t>
+                      </a:r>
+                    </a:p>
+                  </a:txBody>
+                  <a:tcPr/>
+                </a:tc>
+                <a:extLst>
+                  <a:ext uri="{0D108BD9-81ED-4DB2-BD59-A6C34878D82A}">
+                    <a16:rowId xmlns:a16="http://schemas.microsoft.com/office/drawing/2014/main" val="784607734"/>
+                  </a:ext>
+                </a:extLst>
+              </a:tr>
+              <a:tr h="263514">
+                <a:tc>
+                  <a:txBody>
+                    <a:bodyPr/>
+                    <a:lstStyle/>
+                    <a:p>
+                      <a:r>
+                        <a:rPr lang="en-US" sz="1200" dirty="0"/>
+                        <a:t>FDA PMTL</a:t>
+                      </a:r>
+                    </a:p>
+                  </a:txBody>
+                  <a:tcPr/>
+                </a:tc>
+                <a:tc>
+                  <a:txBody>
+                    <a:bodyPr/>
+                    <a:lstStyle/>
+                    <a:p>
+                      <a:r>
+                        <a:rPr lang="en-US" sz="1200" dirty="0"/>
+                        <a:t>PMTL Genes</a:t>
+                      </a:r>
+                    </a:p>
+                  </a:txBody>
+                  <a:tcPr/>
+                </a:tc>
+                <a:tc>
+                  <a:txBody>
+                    <a:bodyPr/>
+                    <a:lstStyle/>
+                    <a:p>
+                      <a:r>
+                        <a:rPr lang="en-US" sz="1200" dirty="0"/>
+                        <a:t>Extraction Only</a:t>
+                      </a:r>
+                    </a:p>
+                  </a:txBody>
+                  <a:tcPr/>
+                </a:tc>
+                <a:extLst>
+                  <a:ext uri="{0D108BD9-81ED-4DB2-BD59-A6C34878D82A}">
+                    <a16:rowId xmlns:a16="http://schemas.microsoft.com/office/drawing/2014/main" val="1763656754"/>
+                  </a:ext>
+                </a:extLst>
+              </a:tr>
+              <a:tr h="263514">
+                <a:tc>
+                  <a:txBody>
+                    <a:bodyPr/>
+                    <a:lstStyle/>
+                    <a:p>
+                      <a:r>
+                        <a:rPr lang="en-US" sz="1200" dirty="0"/>
+                        <a:t>Clinical Trials (CT)</a:t>
+                      </a:r>
+                    </a:p>
+                  </a:txBody>
+                  <a:tcPr/>
+                </a:tc>
+                <a:tc>
+                  <a:txBody>
+                    <a:bodyPr/>
+                    <a:lstStyle/>
+                    <a:p>
+                      <a:r>
+                        <a:rPr lang="en-US" sz="1200" dirty="0"/>
+                        <a:t>Drugs &amp; Diseases</a:t>
+                      </a:r>
+                    </a:p>
+                  </a:txBody>
+                  <a:tcPr/>
+                </a:tc>
+                <a:tc>
+                  <a:txBody>
+                    <a:bodyPr/>
+                    <a:lstStyle/>
+                    <a:p>
+                      <a:r>
+                        <a:rPr lang="en-US" sz="1200" dirty="0"/>
+                        <a:t>Filter drugs by age, and retain phase information.  Manually filter tumors &amp; classify as pediatric or adult</a:t>
+                      </a:r>
+                    </a:p>
+                  </a:txBody>
+                  <a:tcPr/>
+                </a:tc>
+                <a:extLst>
+                  <a:ext uri="{0D108BD9-81ED-4DB2-BD59-A6C34878D82A}">
+                    <a16:rowId xmlns:a16="http://schemas.microsoft.com/office/drawing/2014/main" val="3468938500"/>
+                  </a:ext>
+                </a:extLst>
+              </a:tr>
+              <a:tr h="263514">
+                <a:tc>
+                  <a:txBody>
+                    <a:bodyPr/>
+                    <a:lstStyle/>
+                    <a:p>
+                      <a:r>
+                        <a:rPr lang="en-US" sz="1200" dirty="0"/>
+                        <a:t>Open Targets (OT)</a:t>
+                      </a:r>
+                    </a:p>
+                  </a:txBody>
+                  <a:tcPr/>
+                </a:tc>
+                <a:tc>
+                  <a:txBody>
+                    <a:bodyPr/>
+                    <a:lstStyle/>
+                    <a:p>
+                      <a:r>
+                        <a:rPr lang="en-US" sz="1200" dirty="0"/>
+                        <a:t>Drugs,  Targets, &amp; Diseases</a:t>
+                      </a:r>
+                    </a:p>
+                  </a:txBody>
+                  <a:tcPr/>
+                </a:tc>
+                <a:tc>
+                  <a:txBody>
+                    <a:bodyPr/>
+                    <a:lstStyle/>
+                    <a:p>
+                      <a:r>
+                        <a:rPr lang="en-US" sz="1200" dirty="0"/>
+                        <a:t>Extraction and manually filter for tumors &amp; classify as pediatric or adult </a:t>
+                      </a:r>
+                    </a:p>
+                  </a:txBody>
+                  <a:tcPr/>
+                </a:tc>
+                <a:extLst>
+                  <a:ext uri="{0D108BD9-81ED-4DB2-BD59-A6C34878D82A}">
+                    <a16:rowId xmlns:a16="http://schemas.microsoft.com/office/drawing/2014/main" val="2757924805"/>
+                  </a:ext>
+                </a:extLst>
+              </a:tr>
+              <a:tr h="263514">
+                <a:tc>
+                  <a:txBody>
+                    <a:bodyPr/>
+                    <a:lstStyle/>
+                    <a:p>
+                      <a:r>
+                        <a:rPr lang="en-US" sz="1200" b="0" dirty="0"/>
+                        <a:t>Illuminating the Druggable Genome (IDG)</a:t>
+                      </a:r>
+                    </a:p>
+                  </a:txBody>
+                  <a:tcPr/>
+                </a:tc>
+                <a:tc>
+                  <a:txBody>
+                    <a:bodyPr/>
+                    <a:lstStyle/>
+                    <a:p>
+                      <a:r>
+                        <a:rPr lang="en-US" sz="1200" dirty="0"/>
+                        <a:t>Drugs and Drug Targets </a:t>
+                      </a:r>
+                    </a:p>
+                  </a:txBody>
+                  <a:tcPr/>
+                </a:tc>
+                <a:tc>
+                  <a:txBody>
+                    <a:bodyPr/>
+                    <a:lstStyle/>
+                    <a:p>
+                      <a:r>
+                        <a:rPr lang="en-US" sz="1200" dirty="0"/>
+                        <a:t>Extraction only. No age filter for drugs. </a:t>
+                      </a:r>
+                    </a:p>
+                  </a:txBody>
+                  <a:tcPr/>
+                </a:tc>
+                <a:extLst>
+                  <a:ext uri="{0D108BD9-81ED-4DB2-BD59-A6C34878D82A}">
+                    <a16:rowId xmlns:a16="http://schemas.microsoft.com/office/drawing/2014/main" val="2087620014"/>
+                  </a:ext>
+                </a:extLst>
+              </a:tr>
+            </a:tbl>
+          </a:graphicData>
+        </a:graphic>
+      </p:graphicFrame>
+    </p:spTree>
+    <p:extLst>
+      <p:ext uri="{BB962C8B-B14F-4D97-AF65-F5344CB8AC3E}">
+        <p14:creationId xmlns:p14="http://schemas.microsoft.com/office/powerpoint/2010/main" val="3321473658"/>
+      </p:ext>
+    </p:extLst>
+  </p:cSld>
+  <p:clrMapOvr>
+    <a:masterClrMapping/>
+  </p:clrMapOvr>
+</p:sld>
+</file>
+
+<file path=ppt/slides/slide4.xml><?xml version="1.0" encoding="utf-8"?>
+<p:sld xmlns:a="http://schemas.openxmlformats.org/drawingml/2006/main" xmlns:r="http://schemas.openxmlformats.org/officeDocument/2006/relationships" xmlns:p="http://schemas.openxmlformats.org/presentationml/2006/main">
+  <p:cSld>
+    <p:spTree>
+      <p:nvGrpSpPr>
+        <p:cNvPr id="1" name=""/>
+        <p:cNvGrpSpPr/>
+        <p:nvPr/>
+      </p:nvGrpSpPr>
+      <p:grpSpPr>
+        <a:xfrm>
+          <a:off x="0" y="0"/>
+          <a:ext cx="0" cy="0"/>
+          <a:chOff x="0" y="0"/>
+          <a:chExt cx="0" cy="0"/>
+        </a:xfrm>
+      </p:grpSpPr>
+      <p:sp>
+        <p:nvSpPr>
+          <p:cNvPr id="2" name="Slide Number Placeholder 1"/>
+          <p:cNvSpPr>
+            <a:spLocks noGrp="1"/>
+          </p:cNvSpPr>
+          <p:nvPr>
+            <p:ph type="sldNum" sz="quarter" idx="12"/>
+          </p:nvPr>
+        </p:nvSpPr>
+        <p:spPr/>
+        <p:txBody>
+          <a:bodyPr/>
+          <a:lstStyle/>
+          <a:p>
+            <a:fld id="{AD40181A-01B0-4CB8-8614-1473649F6741}" type="slidenum">
+              <a:rPr lang="en-US" smtClean="0">
+                <a:solidFill>
+                  <a:srgbClr val="FFFFFE"/>
+                </a:solidFill>
+              </a:rPr>
+              <a:t>4</a:t>
+            </a:fld>
+            <a:endParaRPr lang="en-US" dirty="0">
+              <a:solidFill>
+                <a:srgbClr val="FFFFFE"/>
+              </a:solidFill>
+            </a:endParaRPr>
+          </a:p>
+        </p:txBody>
+      </p:sp>
+      <p:sp>
+        <p:nvSpPr>
+          <p:cNvPr id="3" name="Title 2"/>
+          <p:cNvSpPr>
+            <a:spLocks noGrp="1"/>
+          </p:cNvSpPr>
+          <p:nvPr>
+            <p:ph type="title"/>
+          </p:nvPr>
+        </p:nvSpPr>
+        <p:spPr>
+          <a:xfrm>
+            <a:off x="667503" y="73152"/>
+            <a:ext cx="11114189" cy="630936"/>
+          </a:xfrm>
+        </p:spPr>
+        <p:txBody>
+          <a:bodyPr/>
+          <a:lstStyle/>
+          <a:p>
+            <a:r>
+              <a:rPr lang="en-US" dirty="0"/>
+              <a:t>CT Data Processing Pipeline In Depth</a:t>
+            </a:r>
+          </a:p>
+        </p:txBody>
+      </p:sp>
+      <p:pic>
+        <p:nvPicPr>
+          <p:cNvPr id="11" name="Picture 10" descr="A group of white and blue signs&#10;&#10;Description automatically generated with medium confidence">
+            <a:extLst>
+              <a:ext uri="{FF2B5EF4-FFF2-40B4-BE49-F238E27FC236}">
+                <a16:creationId xmlns:a16="http://schemas.microsoft.com/office/drawing/2014/main" id="{1FDC7621-6C93-22A2-6F32-B6668785A271}"/>
+              </a:ext>
+            </a:extLst>
+          </p:cNvPr>
+          <p:cNvPicPr>
+            <a:picLocks noChangeAspect="1"/>
+          </p:cNvPicPr>
+          <p:nvPr/>
+        </p:nvPicPr>
+        <p:blipFill>
+          <a:blip r:embed="rId2">
+            <a:extLst>
+              <a:ext uri="{28A0092B-C50C-407E-A947-70E740481C1C}">
+                <a14:useLocalDpi xmlns:a14="http://schemas.microsoft.com/office/drawing/2010/main" val="0"/>
+              </a:ext>
+            </a:extLst>
+          </a:blip>
+          <a:stretch>
+            <a:fillRect/>
+          </a:stretch>
+        </p:blipFill>
+        <p:spPr>
+          <a:xfrm>
+            <a:off x="1849804" y="588830"/>
+            <a:ext cx="7772400" cy="5141078"/>
           </a:xfrm>
           <a:prstGeom prst="rect">
             <a:avLst/>
@@ -1965,7 +2382,596 @@
     </p:spTree>
     <p:extLst>
       <p:ext uri="{BB962C8B-B14F-4D97-AF65-F5344CB8AC3E}">
-        <p14:creationId xmlns:p14="http://schemas.microsoft.com/office/powerpoint/2010/main" val="3321473658"/>
+        <p14:creationId xmlns:p14="http://schemas.microsoft.com/office/powerpoint/2010/main" val="1448928066"/>
+      </p:ext>
+    </p:extLst>
+  </p:cSld>
+  <p:clrMapOvr>
+    <a:masterClrMapping/>
+  </p:clrMapOvr>
+</p:sld>
+</file>
+
+<file path=ppt/slides/slide5.xml><?xml version="1.0" encoding="utf-8"?>
+<p:sld xmlns:a="http://schemas.openxmlformats.org/drawingml/2006/main" xmlns:r="http://schemas.openxmlformats.org/officeDocument/2006/relationships" xmlns:p="http://schemas.openxmlformats.org/presentationml/2006/main">
+  <p:cSld>
+    <p:spTree>
+      <p:nvGrpSpPr>
+        <p:cNvPr id="1" name=""/>
+        <p:cNvGrpSpPr/>
+        <p:nvPr/>
+      </p:nvGrpSpPr>
+      <p:grpSpPr>
+        <a:xfrm>
+          <a:off x="0" y="0"/>
+          <a:ext cx="0" cy="0"/>
+          <a:chOff x="0" y="0"/>
+          <a:chExt cx="0" cy="0"/>
+        </a:xfrm>
+      </p:grpSpPr>
+      <p:sp>
+        <p:nvSpPr>
+          <p:cNvPr id="2" name="Slide Number Placeholder 1"/>
+          <p:cNvSpPr>
+            <a:spLocks noGrp="1"/>
+          </p:cNvSpPr>
+          <p:nvPr>
+            <p:ph type="sldNum" sz="quarter" idx="12"/>
+          </p:nvPr>
+        </p:nvSpPr>
+        <p:spPr/>
+        <p:txBody>
+          <a:bodyPr/>
+          <a:lstStyle/>
+          <a:p>
+            <a:fld id="{AD40181A-01B0-4CB8-8614-1473649F6741}" type="slidenum">
+              <a:rPr lang="en-US" smtClean="0">
+                <a:solidFill>
+                  <a:srgbClr val="FFFFFE"/>
+                </a:solidFill>
+              </a:rPr>
+              <a:t>5</a:t>
+            </a:fld>
+            <a:endParaRPr lang="en-US" dirty="0">
+              <a:solidFill>
+                <a:srgbClr val="FFFFFE"/>
+              </a:solidFill>
+            </a:endParaRPr>
+          </a:p>
+        </p:txBody>
+      </p:sp>
+      <p:sp>
+        <p:nvSpPr>
+          <p:cNvPr id="3" name="Title 2"/>
+          <p:cNvSpPr>
+            <a:spLocks noGrp="1"/>
+          </p:cNvSpPr>
+          <p:nvPr>
+            <p:ph type="title"/>
+          </p:nvPr>
+        </p:nvSpPr>
+        <p:spPr>
+          <a:xfrm>
+            <a:off x="667503" y="73152"/>
+            <a:ext cx="11114189" cy="630936"/>
+          </a:xfrm>
+        </p:spPr>
+        <p:txBody>
+          <a:bodyPr/>
+          <a:lstStyle/>
+          <a:p>
+            <a:r>
+              <a:rPr lang="en-US" dirty="0"/>
+              <a:t>PMTL and OT Pipeline</a:t>
+            </a:r>
+          </a:p>
+        </p:txBody>
+      </p:sp>
+      <p:pic>
+        <p:nvPicPr>
+          <p:cNvPr id="5" name="Picture 4" descr="A green cylinder with white labels&#10;&#10;Description automatically generated">
+            <a:extLst>
+              <a:ext uri="{FF2B5EF4-FFF2-40B4-BE49-F238E27FC236}">
+                <a16:creationId xmlns:a16="http://schemas.microsoft.com/office/drawing/2014/main" id="{3876EBB1-B5EE-1CA3-3D77-C03052E31A5A}"/>
+              </a:ext>
+            </a:extLst>
+          </p:cNvPr>
+          <p:cNvPicPr>
+            <a:picLocks noChangeAspect="1"/>
+          </p:cNvPicPr>
+          <p:nvPr/>
+        </p:nvPicPr>
+        <p:blipFill>
+          <a:blip r:embed="rId2">
+            <a:extLst>
+              <a:ext uri="{28A0092B-C50C-407E-A947-70E740481C1C}">
+                <a14:useLocalDpi xmlns:a14="http://schemas.microsoft.com/office/drawing/2010/main" val="0"/>
+              </a:ext>
+            </a:extLst>
+          </a:blip>
+          <a:stretch>
+            <a:fillRect/>
+          </a:stretch>
+        </p:blipFill>
+        <p:spPr>
+          <a:xfrm>
+            <a:off x="716290" y="1196457"/>
+            <a:ext cx="10883760" cy="4149266"/>
+          </a:xfrm>
+          <a:prstGeom prst="rect">
+            <a:avLst/>
+          </a:prstGeom>
+        </p:spPr>
+      </p:pic>
+    </p:spTree>
+    <p:extLst>
+      <p:ext uri="{BB962C8B-B14F-4D97-AF65-F5344CB8AC3E}">
+        <p14:creationId xmlns:p14="http://schemas.microsoft.com/office/powerpoint/2010/main" val="3014285941"/>
+      </p:ext>
+    </p:extLst>
+  </p:cSld>
+  <p:clrMapOvr>
+    <a:masterClrMapping/>
+  </p:clrMapOvr>
+</p:sld>
+</file>
+
+<file path=ppt/slides/slide6.xml><?xml version="1.0" encoding="utf-8"?>
+<p:sld xmlns:a="http://schemas.openxmlformats.org/drawingml/2006/main" xmlns:r="http://schemas.openxmlformats.org/officeDocument/2006/relationships" xmlns:p="http://schemas.openxmlformats.org/presentationml/2006/main">
+  <p:cSld>
+    <p:spTree>
+      <p:nvGrpSpPr>
+        <p:cNvPr id="1" name=""/>
+        <p:cNvGrpSpPr/>
+        <p:nvPr/>
+      </p:nvGrpSpPr>
+      <p:grpSpPr>
+        <a:xfrm>
+          <a:off x="0" y="0"/>
+          <a:ext cx="0" cy="0"/>
+          <a:chOff x="0" y="0"/>
+          <a:chExt cx="0" cy="0"/>
+        </a:xfrm>
+      </p:grpSpPr>
+      <p:sp>
+        <p:nvSpPr>
+          <p:cNvPr id="2" name="Slide Number Placeholder 1"/>
+          <p:cNvSpPr>
+            <a:spLocks noGrp="1"/>
+          </p:cNvSpPr>
+          <p:nvPr>
+            <p:ph type="sldNum" sz="quarter" idx="12"/>
+          </p:nvPr>
+        </p:nvSpPr>
+        <p:spPr/>
+        <p:txBody>
+          <a:bodyPr/>
+          <a:lstStyle/>
+          <a:p>
+            <a:fld id="{AD40181A-01B0-4CB8-8614-1473649F6741}" type="slidenum">
+              <a:rPr lang="en-US" smtClean="0">
+                <a:solidFill>
+                  <a:srgbClr val="FFFFFE"/>
+                </a:solidFill>
+              </a:rPr>
+              <a:t>6</a:t>
+            </a:fld>
+            <a:endParaRPr lang="en-US" dirty="0">
+              <a:solidFill>
+                <a:srgbClr val="FFFFFE"/>
+              </a:solidFill>
+            </a:endParaRPr>
+          </a:p>
+        </p:txBody>
+      </p:sp>
+      <p:sp>
+        <p:nvSpPr>
+          <p:cNvPr id="3" name="Title 2"/>
+          <p:cNvSpPr>
+            <a:spLocks noGrp="1"/>
+          </p:cNvSpPr>
+          <p:nvPr>
+            <p:ph type="title"/>
+          </p:nvPr>
+        </p:nvSpPr>
+        <p:spPr>
+          <a:xfrm>
+            <a:off x="667503" y="73152"/>
+            <a:ext cx="11114189" cy="630936"/>
+          </a:xfrm>
+        </p:spPr>
+        <p:txBody>
+          <a:bodyPr/>
+          <a:lstStyle/>
+          <a:p>
+            <a:r>
+              <a:rPr lang="en-US" dirty="0"/>
+              <a:t>PMTL , OT, and IDG Pipeline</a:t>
+            </a:r>
+          </a:p>
+        </p:txBody>
+      </p:sp>
+      <p:pic>
+        <p:nvPicPr>
+          <p:cNvPr id="8" name="Picture 7" descr="A chart of different types of drugs&#10;&#10;Description automatically generated">
+            <a:extLst>
+              <a:ext uri="{FF2B5EF4-FFF2-40B4-BE49-F238E27FC236}">
+                <a16:creationId xmlns:a16="http://schemas.microsoft.com/office/drawing/2014/main" id="{F6A5B88D-35DA-7FE2-74E9-F79DE23096D1}"/>
+              </a:ext>
+            </a:extLst>
+          </p:cNvPr>
+          <p:cNvPicPr>
+            <a:picLocks noChangeAspect="1"/>
+          </p:cNvPicPr>
+          <p:nvPr/>
+        </p:nvPicPr>
+        <p:blipFill>
+          <a:blip r:embed="rId2">
+            <a:extLst>
+              <a:ext uri="{28A0092B-C50C-407E-A947-70E740481C1C}">
+                <a14:useLocalDpi xmlns:a14="http://schemas.microsoft.com/office/drawing/2010/main" val="0"/>
+              </a:ext>
+            </a:extLst>
+          </a:blip>
+          <a:stretch>
+            <a:fillRect/>
+          </a:stretch>
+        </p:blipFill>
+        <p:spPr>
+          <a:xfrm>
+            <a:off x="2685819" y="704088"/>
+            <a:ext cx="8639908" cy="4816237"/>
+          </a:xfrm>
+          <a:prstGeom prst="rect">
+            <a:avLst/>
+          </a:prstGeom>
+        </p:spPr>
+      </p:pic>
+    </p:spTree>
+    <p:extLst>
+      <p:ext uri="{BB962C8B-B14F-4D97-AF65-F5344CB8AC3E}">
+        <p14:creationId xmlns:p14="http://schemas.microsoft.com/office/powerpoint/2010/main" val="1250332686"/>
+      </p:ext>
+    </p:extLst>
+  </p:cSld>
+  <p:clrMapOvr>
+    <a:masterClrMapping/>
+  </p:clrMapOvr>
+</p:sld>
+</file>
+
+<file path=ppt/slides/slide7.xml><?xml version="1.0" encoding="utf-8"?>
+<p:sld xmlns:a="http://schemas.openxmlformats.org/drawingml/2006/main" xmlns:r="http://schemas.openxmlformats.org/officeDocument/2006/relationships" xmlns:p="http://schemas.openxmlformats.org/presentationml/2006/main">
+  <p:cSld>
+    <p:spTree>
+      <p:nvGrpSpPr>
+        <p:cNvPr id="1" name=""/>
+        <p:cNvGrpSpPr/>
+        <p:nvPr/>
+      </p:nvGrpSpPr>
+      <p:grpSpPr>
+        <a:xfrm>
+          <a:off x="0" y="0"/>
+          <a:ext cx="0" cy="0"/>
+          <a:chOff x="0" y="0"/>
+          <a:chExt cx="0" cy="0"/>
+        </a:xfrm>
+      </p:grpSpPr>
+      <p:sp>
+        <p:nvSpPr>
+          <p:cNvPr id="2" name="Slide Number Placeholder 1"/>
+          <p:cNvSpPr>
+            <a:spLocks noGrp="1"/>
+          </p:cNvSpPr>
+          <p:nvPr>
+            <p:ph type="sldNum" sz="quarter" idx="12"/>
+          </p:nvPr>
+        </p:nvSpPr>
+        <p:spPr/>
+        <p:txBody>
+          <a:bodyPr/>
+          <a:lstStyle/>
+          <a:p>
+            <a:fld id="{AD40181A-01B0-4CB8-8614-1473649F6741}" type="slidenum">
+              <a:rPr lang="en-US" smtClean="0">
+                <a:solidFill>
+                  <a:srgbClr val="FFFFFE"/>
+                </a:solidFill>
+              </a:rPr>
+              <a:t>7</a:t>
+            </a:fld>
+            <a:endParaRPr lang="en-US" dirty="0">
+              <a:solidFill>
+                <a:srgbClr val="FFFFFE"/>
+              </a:solidFill>
+            </a:endParaRPr>
+          </a:p>
+        </p:txBody>
+      </p:sp>
+      <p:sp>
+        <p:nvSpPr>
+          <p:cNvPr id="3" name="Title 2"/>
+          <p:cNvSpPr>
+            <a:spLocks noGrp="1"/>
+          </p:cNvSpPr>
+          <p:nvPr>
+            <p:ph type="title"/>
+          </p:nvPr>
+        </p:nvSpPr>
+        <p:spPr>
+          <a:xfrm>
+            <a:off x="667503" y="73152"/>
+            <a:ext cx="11114189" cy="630936"/>
+          </a:xfrm>
+        </p:spPr>
+        <p:txBody>
+          <a:bodyPr/>
+          <a:lstStyle/>
+          <a:p>
+            <a:r>
+              <a:rPr lang="en-US" dirty="0"/>
+              <a:t>Pipeline  for CT &amp; </a:t>
+            </a:r>
+            <a:r>
+              <a:rPr lang="en-US" dirty="0" err="1"/>
+              <a:t>PMTl</a:t>
+            </a:r>
+            <a:r>
+              <a:rPr lang="en-US" dirty="0"/>
+              <a:t>-OT-IDG</a:t>
+            </a:r>
+          </a:p>
+        </p:txBody>
+      </p:sp>
+      <p:pic>
+        <p:nvPicPr>
+          <p:cNvPr id="5" name="Picture 4" descr="A chart of different types of drugs&#10;&#10;Description automatically generated">
+            <a:extLst>
+              <a:ext uri="{FF2B5EF4-FFF2-40B4-BE49-F238E27FC236}">
+                <a16:creationId xmlns:a16="http://schemas.microsoft.com/office/drawing/2014/main" id="{4EFE16F2-3761-8D45-0CFC-022E1E9CAFDF}"/>
+              </a:ext>
+            </a:extLst>
+          </p:cNvPr>
+          <p:cNvPicPr>
+            <a:picLocks noChangeAspect="1"/>
+          </p:cNvPicPr>
+          <p:nvPr/>
+        </p:nvPicPr>
+        <p:blipFill>
+          <a:blip r:embed="rId2">
+            <a:extLst>
+              <a:ext uri="{28A0092B-C50C-407E-A947-70E740481C1C}">
+                <a14:useLocalDpi xmlns:a14="http://schemas.microsoft.com/office/drawing/2010/main" val="0"/>
+              </a:ext>
+            </a:extLst>
+          </a:blip>
+          <a:stretch>
+            <a:fillRect/>
+          </a:stretch>
+        </p:blipFill>
+        <p:spPr>
+          <a:xfrm>
+            <a:off x="5096444" y="1149121"/>
+            <a:ext cx="7344032" cy="4093862"/>
+          </a:xfrm>
+          <a:prstGeom prst="rect">
+            <a:avLst/>
+          </a:prstGeom>
+        </p:spPr>
+      </p:pic>
+      <p:pic>
+        <p:nvPicPr>
+          <p:cNvPr id="7" name="Picture 6" descr="A diagram of a medical procedure&#10;&#10;Description automatically generated with medium confidence">
+            <a:extLst>
+              <a:ext uri="{FF2B5EF4-FFF2-40B4-BE49-F238E27FC236}">
+                <a16:creationId xmlns:a16="http://schemas.microsoft.com/office/drawing/2014/main" id="{E1E43A61-DA54-5889-F83D-63A53C9FB9FA}"/>
+              </a:ext>
+            </a:extLst>
+          </p:cNvPr>
+          <p:cNvPicPr>
+            <a:picLocks noChangeAspect="1"/>
+          </p:cNvPicPr>
+          <p:nvPr/>
+        </p:nvPicPr>
+        <p:blipFill>
+          <a:blip r:embed="rId3">
+            <a:extLst>
+              <a:ext uri="{28A0092B-C50C-407E-A947-70E740481C1C}">
+                <a14:useLocalDpi xmlns:a14="http://schemas.microsoft.com/office/drawing/2010/main" val="0"/>
+              </a:ext>
+            </a:extLst>
+          </a:blip>
+          <a:stretch>
+            <a:fillRect/>
+          </a:stretch>
+        </p:blipFill>
+        <p:spPr>
+          <a:xfrm>
+            <a:off x="-8629" y="774501"/>
+            <a:ext cx="5222304" cy="3577528"/>
+          </a:xfrm>
+          <a:prstGeom prst="rect">
+            <a:avLst/>
+          </a:prstGeom>
+        </p:spPr>
+      </p:pic>
+    </p:spTree>
+    <p:extLst>
+      <p:ext uri="{BB962C8B-B14F-4D97-AF65-F5344CB8AC3E}">
+        <p14:creationId xmlns:p14="http://schemas.microsoft.com/office/powerpoint/2010/main" val="1615329080"/>
+      </p:ext>
+    </p:extLst>
+  </p:cSld>
+  <p:clrMapOvr>
+    <a:masterClrMapping/>
+  </p:clrMapOvr>
+</p:sld>
+</file>
+
+<file path=ppt/slides/slide8.xml><?xml version="1.0" encoding="utf-8"?>
+<p:sld xmlns:a="http://schemas.openxmlformats.org/drawingml/2006/main" xmlns:r="http://schemas.openxmlformats.org/officeDocument/2006/relationships" xmlns:p="http://schemas.openxmlformats.org/presentationml/2006/main">
+  <p:cSld>
+    <p:spTree>
+      <p:nvGrpSpPr>
+        <p:cNvPr id="1" name=""/>
+        <p:cNvGrpSpPr/>
+        <p:nvPr/>
+      </p:nvGrpSpPr>
+      <p:grpSpPr>
+        <a:xfrm>
+          <a:off x="0" y="0"/>
+          <a:ext cx="0" cy="0"/>
+          <a:chOff x="0" y="0"/>
+          <a:chExt cx="0" cy="0"/>
+        </a:xfrm>
+      </p:grpSpPr>
+      <p:sp>
+        <p:nvSpPr>
+          <p:cNvPr id="2" name="Slide Number Placeholder 1"/>
+          <p:cNvSpPr>
+            <a:spLocks noGrp="1"/>
+          </p:cNvSpPr>
+          <p:nvPr>
+            <p:ph type="sldNum" sz="quarter" idx="12"/>
+          </p:nvPr>
+        </p:nvSpPr>
+        <p:spPr/>
+        <p:txBody>
+          <a:bodyPr/>
+          <a:lstStyle/>
+          <a:p>
+            <a:fld id="{AD40181A-01B0-4CB8-8614-1473649F6741}" type="slidenum">
+              <a:rPr lang="en-US" smtClean="0">
+                <a:solidFill>
+                  <a:srgbClr val="FFFFFE"/>
+                </a:solidFill>
+              </a:rPr>
+              <a:t>8</a:t>
+            </a:fld>
+            <a:endParaRPr lang="en-US" dirty="0">
+              <a:solidFill>
+                <a:srgbClr val="FFFFFE"/>
+              </a:solidFill>
+            </a:endParaRPr>
+          </a:p>
+        </p:txBody>
+      </p:sp>
+      <p:sp>
+        <p:nvSpPr>
+          <p:cNvPr id="3" name="Title 2"/>
+          <p:cNvSpPr>
+            <a:spLocks noGrp="1"/>
+          </p:cNvSpPr>
+          <p:nvPr>
+            <p:ph type="title"/>
+          </p:nvPr>
+        </p:nvSpPr>
+        <p:spPr>
+          <a:xfrm>
+            <a:off x="667503" y="73152"/>
+            <a:ext cx="11114189" cy="630936"/>
+          </a:xfrm>
+        </p:spPr>
+        <p:txBody>
+          <a:bodyPr/>
+          <a:lstStyle/>
+          <a:p>
+            <a:r>
+              <a:rPr lang="en-US" dirty="0"/>
+              <a:t>Integrated Pipeline Overview</a:t>
+            </a:r>
+          </a:p>
+        </p:txBody>
+      </p:sp>
+    </p:spTree>
+    <p:extLst>
+      <p:ext uri="{BB962C8B-B14F-4D97-AF65-F5344CB8AC3E}">
+        <p14:creationId xmlns:p14="http://schemas.microsoft.com/office/powerpoint/2010/main" val="2863838922"/>
+      </p:ext>
+    </p:extLst>
+  </p:cSld>
+  <p:clrMapOvr>
+    <a:masterClrMapping/>
+  </p:clrMapOvr>
+</p:sld>
+</file>
+
+<file path=ppt/slides/slide9.xml><?xml version="1.0" encoding="utf-8"?>
+<p:sld xmlns:a="http://schemas.openxmlformats.org/drawingml/2006/main" xmlns:r="http://schemas.openxmlformats.org/officeDocument/2006/relationships" xmlns:p="http://schemas.openxmlformats.org/presentationml/2006/main">
+  <p:cSld>
+    <p:spTree>
+      <p:nvGrpSpPr>
+        <p:cNvPr id="1" name=""/>
+        <p:cNvGrpSpPr/>
+        <p:nvPr/>
+      </p:nvGrpSpPr>
+      <p:grpSpPr>
+        <a:xfrm>
+          <a:off x="0" y="0"/>
+          <a:ext cx="0" cy="0"/>
+          <a:chOff x="0" y="0"/>
+          <a:chExt cx="0" cy="0"/>
+        </a:xfrm>
+      </p:grpSpPr>
+      <p:sp>
+        <p:nvSpPr>
+          <p:cNvPr id="2" name="Slide Number Placeholder 1">
+            <a:extLst>
+              <a:ext uri="{FF2B5EF4-FFF2-40B4-BE49-F238E27FC236}">
+                <a16:creationId xmlns:a16="http://schemas.microsoft.com/office/drawing/2014/main" id="{2210EC52-11C7-AD9B-CC02-F9723323A7B3}"/>
+              </a:ext>
+            </a:extLst>
+          </p:cNvPr>
+          <p:cNvSpPr>
+            <a:spLocks noGrp="1"/>
+          </p:cNvSpPr>
+          <p:nvPr>
+            <p:ph type="sldNum" sz="quarter" idx="12"/>
+          </p:nvPr>
+        </p:nvSpPr>
+        <p:spPr/>
+        <p:txBody>
+          <a:bodyPr/>
+          <a:lstStyle/>
+          <a:p>
+            <a:fld id="{AD40181A-01B0-4CB8-8614-1473649F6741}" type="slidenum">
+              <a:rPr lang="en-US" smtClean="0"/>
+              <a:pPr/>
+              <a:t>9</a:t>
+            </a:fld>
+            <a:endParaRPr lang="en-US" dirty="0"/>
+          </a:p>
+        </p:txBody>
+      </p:sp>
+      <p:sp>
+        <p:nvSpPr>
+          <p:cNvPr id="3" name="Title 2">
+            <a:extLst>
+              <a:ext uri="{FF2B5EF4-FFF2-40B4-BE49-F238E27FC236}">
+                <a16:creationId xmlns:a16="http://schemas.microsoft.com/office/drawing/2014/main" id="{5219F361-6D92-2CF5-72C4-2BD65F5D468E}"/>
+              </a:ext>
+            </a:extLst>
+          </p:cNvPr>
+          <p:cNvSpPr>
+            <a:spLocks noGrp="1"/>
+          </p:cNvSpPr>
+          <p:nvPr>
+            <p:ph type="title"/>
+          </p:nvPr>
+        </p:nvSpPr>
+        <p:spPr/>
+        <p:txBody>
+          <a:bodyPr/>
+          <a:lstStyle/>
+          <a:p>
+            <a:endParaRPr lang="en-US"/>
+          </a:p>
+        </p:txBody>
+      </p:sp>
+    </p:spTree>
+    <p:extLst>
+      <p:ext uri="{BB962C8B-B14F-4D97-AF65-F5344CB8AC3E}">
+        <p14:creationId xmlns:p14="http://schemas.microsoft.com/office/powerpoint/2010/main" val="3588777267"/>
       </p:ext>
     </p:extLst>
   </p:cSld>
@@ -2613,15 +3619,6 @@
 </file>
 
 <file path=customXml/item2.xml><?xml version="1.0" encoding="utf-8"?>
-<?mso-contentType ?>
-<FormTemplates xmlns="http://schemas.microsoft.com/sharepoint/v3/contenttype/forms">
-  <Display>DocumentLibraryForm</Display>
-  <Edit>DocumentLibraryForm</Edit>
-  <New>DocumentLibraryForm</New>
-</FormTemplates>
-</file>
-
-<file path=customXml/item3.xml><?xml version="1.0" encoding="utf-8"?>
 <p:properties xmlns:p="http://schemas.microsoft.com/office/2006/metadata/properties" xmlns:xsi="http://www.w3.org/2001/XMLSchema-instance" xmlns:pc="http://schemas.microsoft.com/office/infopath/2007/PartnerControls">
   <documentManagement>
     <h6a4a4262ab844b18de92e197378cee0 xmlns="e96402cb-0a6e-49e7-8465-cfae72b5129c">
@@ -2637,6 +3634,15 @@
     <IconOverlay xmlns="http://schemas.microsoft.com/sharepoint/v4" xsi:nil="true"/>
   </documentManagement>
 </p:properties>
+</file>
+
+<file path=customXml/item3.xml><?xml version="1.0" encoding="utf-8"?>
+<?mso-contentType ?>
+<FormTemplates xmlns="http://schemas.microsoft.com/sharepoint/v3/contenttype/forms">
+  <Display>DocumentLibraryForm</Display>
+  <Edit>DocumentLibraryForm</Edit>
+  <New>DocumentLibraryForm</New>
+</FormTemplates>
 </file>
 
 <file path=customXml/itemProps1.xml><?xml version="1.0" encoding="utf-8"?>
@@ -2661,14 +3667,6 @@
 </file>
 
 <file path=customXml/itemProps2.xml><?xml version="1.0" encoding="utf-8"?>
-<ds:datastoreItem xmlns:ds="http://schemas.openxmlformats.org/officeDocument/2006/customXml" ds:itemID="{8E78B9CA-BC85-4AC4-82A4-AD53C20980F5}">
-  <ds:schemaRefs>
-    <ds:schemaRef ds:uri="http://schemas.microsoft.com/sharepoint/v3/contenttype/forms"/>
-  </ds:schemaRefs>
-</ds:datastoreItem>
-</file>
-
-<file path=customXml/itemProps3.xml><?xml version="1.0" encoding="utf-8"?>
 <ds:datastoreItem xmlns:ds="http://schemas.openxmlformats.org/officeDocument/2006/customXml" ds:itemID="{7C493EF0-0BE4-4E84-A0BC-FF9879CDB9E8}">
   <ds:schemaRefs>
     <ds:schemaRef ds:uri="http://schemas.microsoft.com/office/2006/metadata/properties"/>
@@ -2679,4 +3677,12 @@
     <ds:schemaRef ds:uri="http://schemas.microsoft.com/sharepoint/v4"/>
   </ds:schemaRefs>
 </ds:datastoreItem>
+</file>
+
+<file path=customXml/itemProps3.xml><?xml version="1.0" encoding="utf-8"?>
+<ds:datastoreItem xmlns:ds="http://schemas.openxmlformats.org/officeDocument/2006/customXml" ds:itemID="{8E78B9CA-BC85-4AC4-82A4-AD53C20980F5}">
+  <ds:schemaRefs>
+    <ds:schemaRef ds:uri="http://schemas.microsoft.com/sharepoint/v3/contenttype/forms"/>
+  </ds:schemaRefs>
+</ds:datastoreItem>
 </file>
</xml_diff>